<commit_message>
Changed some wrong notations
</commit_message>
<xml_diff>
--- a/RA-L/pictures/pdf/multirobotSliderHardware.pptx
+++ b/RA-L/pictures/pdf/multirobotSliderHardware.pptx
@@ -3533,8 +3533,8 @@
             </p:nvSpPr>
             <p:spPr>
               <a:xfrm>
-                <a:off x="5753700" y="2274043"/>
-                <a:ext cx="1175442" cy="2208675"/>
+                <a:off x="5077531" y="2274043"/>
+                <a:ext cx="1851611" cy="1487473"/>
               </a:xfrm>
               <a:prstGeom prst="rect">
                 <a:avLst/>
@@ -3653,8 +3653,8 @@
             </p:nvSpPr>
             <p:spPr>
               <a:xfrm>
-                <a:off x="5731318" y="7427405"/>
-                <a:ext cx="1055129" cy="2208675"/>
+                <a:off x="5201991" y="7427405"/>
+                <a:ext cx="1584455" cy="1487473"/>
               </a:xfrm>
               <a:prstGeom prst="rect">
                 <a:avLst/>
@@ -3697,8 +3697,8 @@
             </p:nvSpPr>
             <p:spPr>
               <a:xfrm>
-                <a:off x="8769696" y="9448468"/>
-                <a:ext cx="1240323" cy="2208675"/>
+                <a:off x="8189005" y="9448468"/>
+                <a:ext cx="1821018" cy="1487473"/>
               </a:xfrm>
               <a:prstGeom prst="rect">
                 <a:avLst/>

</xml_diff>